<commit_message>
Improved Propulsion Editor, bug fixes
</commit_message>
<xml_diff>
--- a/images/propulsionElements/rcsMockups.pptx
+++ b/images/propulsionElements/rcsMockups.pptx
@@ -9956,6 +9956,60 @@
           </p:txBody>
         </p:sp>
       </p:grpSp>
+      <p:sp>
+        <p:nvSpPr>
+          <p:cNvPr id="2" name="Oval 1">
+            <a:extLst>
+              <a:ext uri="{FF2B5EF4-FFF2-40B4-BE49-F238E27FC236}">
+                <a16:creationId xmlns:a16="http://schemas.microsoft.com/office/drawing/2014/main" id="{3A1095AC-6A79-CB42-A4F7-DA1BCDC8A8C1}"/>
+              </a:ext>
+            </a:extLst>
+          </p:cNvPr>
+          <p:cNvSpPr/>
+          <p:nvPr/>
+        </p:nvSpPr>
+        <p:spPr>
+          <a:xfrm>
+            <a:off x="843149" y="2585852"/>
+            <a:ext cx="855023" cy="843148"/>
+          </a:xfrm>
+          <a:prstGeom prst="ellipse">
+            <a:avLst/>
+          </a:prstGeom>
+          <a:solidFill>
+            <a:schemeClr val="bg1"/>
+          </a:solidFill>
+          <a:ln w="76200">
+            <a:solidFill>
+              <a:schemeClr val="tx1"/>
+            </a:solidFill>
+          </a:ln>
+        </p:spPr>
+        <p:style>
+          <a:lnRef idx="2">
+            <a:schemeClr val="accent1">
+              <a:shade val="50000"/>
+            </a:schemeClr>
+          </a:lnRef>
+          <a:fillRef idx="1">
+            <a:schemeClr val="accent1"/>
+          </a:fillRef>
+          <a:effectRef idx="0">
+            <a:schemeClr val="accent1"/>
+          </a:effectRef>
+          <a:fontRef idx="minor">
+            <a:schemeClr val="lt1"/>
+          </a:fontRef>
+        </p:style>
+        <p:txBody>
+          <a:bodyPr rtlCol="0" anchor="ctr"/>
+          <a:lstStyle/>
+          <a:p>
+            <a:pPr algn="ctr"/>
+            <a:endParaRPr lang="en-US"/>
+          </a:p>
+        </p:txBody>
+      </p:sp>
     </p:spTree>
     <p:extLst>
       <p:ext uri="{BB962C8B-B14F-4D97-AF65-F5344CB8AC3E}">

</xml_diff>

<commit_message>
GUI-added time module, clean up, bug fixes, SIM-added time module, added python module
</commit_message>
<xml_diff>
--- a/images/propulsionElements/rcsMockups.pptx
+++ b/images/propulsionElements/rcsMockups.pptx
@@ -262,7 +262,7 @@
           <a:p>
             <a:fld id="{48119B2E-822D-0646-9635-2ECFF55D1B89}" type="datetimeFigureOut">
               <a:rPr lang="en-US" smtClean="0"/>
-              <a:t>11/28/19</a:t>
+              <a:t>11/29/19</a:t>
             </a:fld>
             <a:endParaRPr lang="en-US"/>
           </a:p>
@@ -460,7 +460,7 @@
           <a:p>
             <a:fld id="{48119B2E-822D-0646-9635-2ECFF55D1B89}" type="datetimeFigureOut">
               <a:rPr lang="en-US" smtClean="0"/>
-              <a:t>11/28/19</a:t>
+              <a:t>11/29/19</a:t>
             </a:fld>
             <a:endParaRPr lang="en-US"/>
           </a:p>
@@ -668,7 +668,7 @@
           <a:p>
             <a:fld id="{48119B2E-822D-0646-9635-2ECFF55D1B89}" type="datetimeFigureOut">
               <a:rPr lang="en-US" smtClean="0"/>
-              <a:t>11/28/19</a:t>
+              <a:t>11/29/19</a:t>
             </a:fld>
             <a:endParaRPr lang="en-US"/>
           </a:p>
@@ -866,7 +866,7 @@
           <a:p>
             <a:fld id="{48119B2E-822D-0646-9635-2ECFF55D1B89}" type="datetimeFigureOut">
               <a:rPr lang="en-US" smtClean="0"/>
-              <a:t>11/28/19</a:t>
+              <a:t>11/29/19</a:t>
             </a:fld>
             <a:endParaRPr lang="en-US"/>
           </a:p>
@@ -1141,7 +1141,7 @@
           <a:p>
             <a:fld id="{48119B2E-822D-0646-9635-2ECFF55D1B89}" type="datetimeFigureOut">
               <a:rPr lang="en-US" smtClean="0"/>
-              <a:t>11/28/19</a:t>
+              <a:t>11/29/19</a:t>
             </a:fld>
             <a:endParaRPr lang="en-US"/>
           </a:p>
@@ -1406,7 +1406,7 @@
           <a:p>
             <a:fld id="{48119B2E-822D-0646-9635-2ECFF55D1B89}" type="datetimeFigureOut">
               <a:rPr lang="en-US" smtClean="0"/>
-              <a:t>11/28/19</a:t>
+              <a:t>11/29/19</a:t>
             </a:fld>
             <a:endParaRPr lang="en-US"/>
           </a:p>
@@ -1818,7 +1818,7 @@
           <a:p>
             <a:fld id="{48119B2E-822D-0646-9635-2ECFF55D1B89}" type="datetimeFigureOut">
               <a:rPr lang="en-US" smtClean="0"/>
-              <a:t>11/28/19</a:t>
+              <a:t>11/29/19</a:t>
             </a:fld>
             <a:endParaRPr lang="en-US"/>
           </a:p>
@@ -1959,7 +1959,7 @@
           <a:p>
             <a:fld id="{48119B2E-822D-0646-9635-2ECFF55D1B89}" type="datetimeFigureOut">
               <a:rPr lang="en-US" smtClean="0"/>
-              <a:t>11/28/19</a:t>
+              <a:t>11/29/19</a:t>
             </a:fld>
             <a:endParaRPr lang="en-US"/>
           </a:p>
@@ -2072,7 +2072,7 @@
           <a:p>
             <a:fld id="{48119B2E-822D-0646-9635-2ECFF55D1B89}" type="datetimeFigureOut">
               <a:rPr lang="en-US" smtClean="0"/>
-              <a:t>11/28/19</a:t>
+              <a:t>11/29/19</a:t>
             </a:fld>
             <a:endParaRPr lang="en-US"/>
           </a:p>
@@ -2383,7 +2383,7 @@
           <a:p>
             <a:fld id="{48119B2E-822D-0646-9635-2ECFF55D1B89}" type="datetimeFigureOut">
               <a:rPr lang="en-US" smtClean="0"/>
-              <a:t>11/28/19</a:t>
+              <a:t>11/29/19</a:t>
             </a:fld>
             <a:endParaRPr lang="en-US"/>
           </a:p>
@@ -2671,7 +2671,7 @@
           <a:p>
             <a:fld id="{48119B2E-822D-0646-9635-2ECFF55D1B89}" type="datetimeFigureOut">
               <a:rPr lang="en-US" smtClean="0"/>
-              <a:t>11/28/19</a:t>
+              <a:t>11/29/19</a:t>
             </a:fld>
             <a:endParaRPr lang="en-US"/>
           </a:p>
@@ -2912,7 +2912,7 @@
           <a:p>
             <a:fld id="{48119B2E-822D-0646-9635-2ECFF55D1B89}" type="datetimeFigureOut">
               <a:rPr lang="en-US" smtClean="0"/>
-              <a:t>11/28/19</a:t>
+              <a:t>11/29/19</a:t>
             </a:fld>
             <a:endParaRPr lang="en-US"/>
           </a:p>
@@ -9737,6 +9737,220 @@
           </p:txBody>
         </p:sp>
       </p:grpSp>
+      <p:cxnSp>
+        <p:nvCxnSpPr>
+          <p:cNvPr id="3" name="Straight Connector 2">
+            <a:extLst>
+              <a:ext uri="{FF2B5EF4-FFF2-40B4-BE49-F238E27FC236}">
+                <a16:creationId xmlns:a16="http://schemas.microsoft.com/office/drawing/2014/main" id="{E2F38234-FB2B-5D4A-97FC-A88034DC0610}"/>
+              </a:ext>
+            </a:extLst>
+          </p:cNvPr>
+          <p:cNvCxnSpPr>
+            <a:stCxn id="23" idx="0"/>
+            <a:endCxn id="23" idx="2"/>
+          </p:cNvCxnSpPr>
+          <p:nvPr/>
+        </p:nvCxnSpPr>
+        <p:spPr>
+          <a:xfrm>
+            <a:off x="3028750" y="4508250"/>
+            <a:ext cx="2505694" cy="0"/>
+          </a:xfrm>
+          <a:prstGeom prst="line">
+            <a:avLst/>
+          </a:prstGeom>
+          <a:ln w="130175">
+            <a:solidFill>
+              <a:schemeClr val="tx1"/>
+            </a:solidFill>
+          </a:ln>
+        </p:spPr>
+        <p:style>
+          <a:lnRef idx="1">
+            <a:schemeClr val="accent1"/>
+          </a:lnRef>
+          <a:fillRef idx="0">
+            <a:schemeClr val="accent1"/>
+          </a:fillRef>
+          <a:effectRef idx="0">
+            <a:schemeClr val="accent1"/>
+          </a:effectRef>
+          <a:fontRef idx="minor">
+            <a:schemeClr val="tx1"/>
+          </a:fontRef>
+        </p:style>
+      </p:cxnSp>
+      <p:cxnSp>
+        <p:nvCxnSpPr>
+          <p:cNvPr id="24" name="Straight Connector 23">
+            <a:extLst>
+              <a:ext uri="{FF2B5EF4-FFF2-40B4-BE49-F238E27FC236}">
+                <a16:creationId xmlns:a16="http://schemas.microsoft.com/office/drawing/2014/main" id="{F467A552-8446-424B-9643-DE861FD0CF76}"/>
+              </a:ext>
+            </a:extLst>
+          </p:cNvPr>
+          <p:cNvCxnSpPr/>
+          <p:nvPr/>
+        </p:nvCxnSpPr>
+        <p:spPr>
+          <a:xfrm>
+            <a:off x="9120114" y="5596933"/>
+            <a:ext cx="1114425" cy="0"/>
+          </a:xfrm>
+          <a:prstGeom prst="line">
+            <a:avLst/>
+          </a:prstGeom>
+          <a:ln w="41275">
+            <a:solidFill>
+              <a:schemeClr val="tx1"/>
+            </a:solidFill>
+          </a:ln>
+        </p:spPr>
+        <p:style>
+          <a:lnRef idx="1">
+            <a:schemeClr val="accent1"/>
+          </a:lnRef>
+          <a:fillRef idx="0">
+            <a:schemeClr val="accent1"/>
+          </a:fillRef>
+          <a:effectRef idx="0">
+            <a:schemeClr val="accent1"/>
+          </a:effectRef>
+          <a:fontRef idx="minor">
+            <a:schemeClr val="tx1"/>
+          </a:fontRef>
+        </p:style>
+      </p:cxnSp>
+      <p:cxnSp>
+        <p:nvCxnSpPr>
+          <p:cNvPr id="45" name="Straight Connector 44">
+            <a:extLst>
+              <a:ext uri="{FF2B5EF4-FFF2-40B4-BE49-F238E27FC236}">
+                <a16:creationId xmlns:a16="http://schemas.microsoft.com/office/drawing/2014/main" id="{43B1C24B-3620-744F-B174-F9D87363DFF4}"/>
+              </a:ext>
+            </a:extLst>
+          </p:cNvPr>
+          <p:cNvCxnSpPr>
+            <a:cxnSpLocks/>
+          </p:cNvCxnSpPr>
+          <p:nvPr/>
+        </p:nvCxnSpPr>
+        <p:spPr>
+          <a:xfrm flipV="1">
+            <a:off x="9120114" y="5596933"/>
+            <a:ext cx="1114425" cy="276451"/>
+          </a:xfrm>
+          <a:prstGeom prst="line">
+            <a:avLst/>
+          </a:prstGeom>
+          <a:ln w="41275">
+            <a:solidFill>
+              <a:schemeClr val="tx1"/>
+            </a:solidFill>
+          </a:ln>
+        </p:spPr>
+        <p:style>
+          <a:lnRef idx="1">
+            <a:schemeClr val="accent1"/>
+          </a:lnRef>
+          <a:fillRef idx="0">
+            <a:schemeClr val="accent1"/>
+          </a:fillRef>
+          <a:effectRef idx="0">
+            <a:schemeClr val="accent1"/>
+          </a:effectRef>
+          <a:fontRef idx="minor">
+            <a:schemeClr val="tx1"/>
+          </a:fontRef>
+        </p:style>
+      </p:cxnSp>
+      <p:cxnSp>
+        <p:nvCxnSpPr>
+          <p:cNvPr id="48" name="Straight Connector 47">
+            <a:extLst>
+              <a:ext uri="{FF2B5EF4-FFF2-40B4-BE49-F238E27FC236}">
+                <a16:creationId xmlns:a16="http://schemas.microsoft.com/office/drawing/2014/main" id="{4611BF58-5086-3340-92E6-575C4748D09D}"/>
+              </a:ext>
+            </a:extLst>
+          </p:cNvPr>
+          <p:cNvCxnSpPr>
+            <a:cxnSpLocks/>
+          </p:cNvCxnSpPr>
+          <p:nvPr/>
+        </p:nvCxnSpPr>
+        <p:spPr>
+          <a:xfrm>
+            <a:off x="9163250" y="5873384"/>
+            <a:ext cx="1071289" cy="127366"/>
+          </a:xfrm>
+          <a:prstGeom prst="line">
+            <a:avLst/>
+          </a:prstGeom>
+          <a:ln w="41275">
+            <a:solidFill>
+              <a:schemeClr val="tx1"/>
+            </a:solidFill>
+          </a:ln>
+        </p:spPr>
+        <p:style>
+          <a:lnRef idx="1">
+            <a:schemeClr val="accent1"/>
+          </a:lnRef>
+          <a:fillRef idx="0">
+            <a:schemeClr val="accent1"/>
+          </a:fillRef>
+          <a:effectRef idx="0">
+            <a:schemeClr val="accent1"/>
+          </a:effectRef>
+          <a:fontRef idx="minor">
+            <a:schemeClr val="tx1"/>
+          </a:fontRef>
+        </p:style>
+      </p:cxnSp>
+      <p:cxnSp>
+        <p:nvCxnSpPr>
+          <p:cNvPr id="50" name="Straight Connector 49">
+            <a:extLst>
+              <a:ext uri="{FF2B5EF4-FFF2-40B4-BE49-F238E27FC236}">
+                <a16:creationId xmlns:a16="http://schemas.microsoft.com/office/drawing/2014/main" id="{7B5EFA09-8B81-FB4A-8E0F-6D0AA75272E9}"/>
+              </a:ext>
+            </a:extLst>
+          </p:cNvPr>
+          <p:cNvCxnSpPr>
+            <a:cxnSpLocks/>
+          </p:cNvCxnSpPr>
+          <p:nvPr/>
+        </p:nvCxnSpPr>
+        <p:spPr>
+          <a:xfrm flipV="1">
+            <a:off x="9163250" y="6025784"/>
+            <a:ext cx="1071289" cy="195639"/>
+          </a:xfrm>
+          <a:prstGeom prst="line">
+            <a:avLst/>
+          </a:prstGeom>
+          <a:ln w="41275">
+            <a:solidFill>
+              <a:schemeClr val="tx1"/>
+            </a:solidFill>
+          </a:ln>
+        </p:spPr>
+        <p:style>
+          <a:lnRef idx="1">
+            <a:schemeClr val="accent1"/>
+          </a:lnRef>
+          <a:fillRef idx="0">
+            <a:schemeClr val="accent1"/>
+          </a:fillRef>
+          <a:effectRef idx="0">
+            <a:schemeClr val="accent1"/>
+          </a:effectRef>
+          <a:fontRef idx="minor">
+            <a:schemeClr val="tx1"/>
+          </a:fontRef>
+        </p:style>
+      </p:cxnSp>
     </p:spTree>
     <p:extLst>
       <p:ext uri="{BB962C8B-B14F-4D97-AF65-F5344CB8AC3E}">

</xml_diff>